<commit_message>
Update slides and README.md
</commit_message>
<xml_diff>
--- a/2019-09-06/Leaps&Bounds.pptx
+++ b/2019-09-06/Leaps&Bounds.pptx
@@ -16,6 +16,7 @@
     <p:sldId id="261" r:id="rId11"/>
     <p:sldId id="262" r:id="rId12"/>
     <p:sldId id="263" r:id="rId13"/>
+    <p:sldId id="264" r:id="rId14"/>
   </p:sldIdLst>
   <p:sldSz cy="5143500" cx="9144000"/>
   <p:notesSz cx="6858000" cy="9144000"/>
@@ -1441,6 +1442,105 @@
       <p:sp>
         <p:nvSpPr>
           <p:cNvPr id="135" name="Google Shape;135;g4191259277_0_114:notes"/>
+          <p:cNvSpPr txBox="1"/>
+          <p:nvPr>
+            <p:ph idx="1" type="body"/>
+          </p:nvPr>
+        </p:nvSpPr>
+        <p:spPr>
+          <a:xfrm>
+            <a:off x="685800" y="4343400"/>
+            <a:ext cx="5486400" cy="4114800"/>
+          </a:xfrm>
+          <a:prstGeom prst="rect">
+            <a:avLst/>
+          </a:prstGeom>
+        </p:spPr>
+        <p:txBody>
+          <a:bodyPr anchorCtr="0" anchor="t" bIns="91425" lIns="91425" spcFirstLastPara="1" rIns="91425" wrap="square" tIns="91425">
+            <a:noAutofit/>
+          </a:bodyPr>
+          <a:lstStyle/>
+          <a:p>
+            <a:pPr indent="0" lvl="0" marL="0" rtl="0" algn="l">
+              <a:spcBef>
+                <a:spcPts val="0"/>
+              </a:spcBef>
+              <a:spcAft>
+                <a:spcPts val="0"/>
+              </a:spcAft>
+              <a:buNone/>
+            </a:pPr>
+            <a:r>
+              <a:t/>
+            </a:r>
+            <a:endParaRPr/>
+          </a:p>
+        </p:txBody>
+      </p:sp>
+    </p:spTree>
+  </p:cSld>
+  <p:clrMapOvr>
+    <a:masterClrMapping/>
+  </p:clrMapOvr>
+</p:notes>
+</file>
+
+<file path=ppt/notesSlides/notesSlide9.xml><?xml version="1.0" encoding="utf-8"?>
+<p:notes xmlns:a="http://schemas.openxmlformats.org/drawingml/2006/main" xmlns:r="http://schemas.openxmlformats.org/officeDocument/2006/relationships" xmlns:mc="http://schemas.openxmlformats.org/markup-compatibility/2006" xmlns:mv="urn:schemas-microsoft-com:mac:vml" xmlns:p="http://schemas.openxmlformats.org/presentationml/2006/main" xmlns:c="http://schemas.openxmlformats.org/drawingml/2006/chart" xmlns:dgm="http://schemas.openxmlformats.org/drawingml/2006/diagram" xmlns:o="urn:schemas-microsoft-com:office:office" xmlns:v="urn:schemas-microsoft-com:vml" xmlns:pvml="urn:schemas-microsoft-com:office:powerpoint" xmlns:com="http://schemas.openxmlformats.org/drawingml/2006/compatibility" xmlns:p14="http://schemas.microsoft.com/office/powerpoint/2010/main" xmlns:p15="http://schemas.microsoft.com/office/powerpoint/2012/main" showMasterPhAnim="0" showMasterSp="0">
+  <p:cSld>
+    <p:spTree>
+      <p:nvGrpSpPr>
+        <p:cNvPr id="139" name="Shape 139"/>
+        <p:cNvGrpSpPr/>
+        <p:nvPr/>
+      </p:nvGrpSpPr>
+      <p:grpSpPr>
+        <a:xfrm>
+          <a:off x="0" y="0"/>
+          <a:ext cx="0" cy="0"/>
+          <a:chOff x="0" y="0"/>
+          <a:chExt cx="0" cy="0"/>
+        </a:xfrm>
+      </p:grpSpPr>
+      <p:sp>
+        <p:nvSpPr>
+          <p:cNvPr id="140" name="Google Shape;140;g6274fe36dc_0_3:notes"/>
+          <p:cNvSpPr/>
+          <p:nvPr>
+            <p:ph idx="2" type="sldImg"/>
+          </p:nvPr>
+        </p:nvSpPr>
+        <p:spPr>
+          <a:xfrm>
+            <a:off x="381300" y="685800"/>
+            <a:ext cx="6096000" cy="3429000"/>
+          </a:xfrm>
+          <a:custGeom>
+            <a:rect b="b" l="l" r="r" t="t"/>
+            <a:pathLst>
+              <a:path extrusionOk="0" h="120000" w="120000">
+                <a:moveTo>
+                  <a:pt x="0" y="0"/>
+                </a:moveTo>
+                <a:lnTo>
+                  <a:pt x="120000" y="0"/>
+                </a:lnTo>
+                <a:lnTo>
+                  <a:pt x="120000" y="120000"/>
+                </a:lnTo>
+                <a:lnTo>
+                  <a:pt x="0" y="120000"/>
+                </a:lnTo>
+                <a:close/>
+              </a:path>
+            </a:pathLst>
+          </a:custGeom>
+        </p:spPr>
+      </p:sp>
+      <p:sp>
+        <p:nvSpPr>
+          <p:cNvPr id="141" name="Google Shape;141;g6274fe36dc_0_3:notes"/>
           <p:cNvSpPr txBox="1"/>
           <p:nvPr>
             <p:ph idx="1" type="body"/>
@@ -6330,7 +6430,7 @@
             </a:pPr>
             <a:r>
               <a:rPr lang="en"/>
-              <a:t>N lions are standing on the number line playing leapfrog. </a:t>
+              <a:t>N lions are standing on the number line playing leapfrog.</a:t>
             </a:r>
             <a:endParaRPr/>
           </a:p>
@@ -6372,27 +6472,21 @@
                 <a:spcPts val="1600"/>
               </a:spcBef>
               <a:spcAft>
-                <a:spcPts val="0"/>
+                <a:spcPts val="1600"/>
               </a:spcAft>
               <a:buNone/>
             </a:pPr>
             <a:r>
-              <a:t/>
-            </a:r>
-            <a:endParaRPr/>
-          </a:p>
-          <a:p>
-            <a:pPr indent="0" lvl="0" marL="0" rtl="0" algn="l">
-              <a:spcBef>
-                <a:spcPts val="1600"/>
-              </a:spcBef>
-              <a:spcAft>
-                <a:spcPts val="1600"/>
-              </a:spcAft>
-              <a:buNone/>
-            </a:pPr>
-            <a:r>
-              <a:t/>
+              <a:rPr lang="en"/>
+              <a:t>More formally, you can move the lions in any order as many times as you want. When you choose to move a lion, it moves to the next</a:t>
+            </a:r>
+            <a:r>
+              <a:rPr lang="en"/>
+              <a:t> empty spot</a:t>
+            </a:r>
+            <a:r>
+              <a:rPr lang="en"/>
+              <a:t> to the right. </a:t>
             </a:r>
             <a:endParaRPr/>
           </a:p>
@@ -8870,7 +8964,7 @@
             </a:pPr>
             <a:r>
               <a:rPr lang="en"/>
-              <a:t>Checker</a:t>
+              <a:t>Submitting</a:t>
             </a:r>
             <a:endParaRPr/>
           </a:p>
@@ -8904,10 +8998,14 @@
                 <a:spcPts val="0"/>
               </a:spcBef>
               <a:spcAft>
-                <a:spcPts val="1600"/>
+                <a:spcPts val="0"/>
               </a:spcAft>
               <a:buNone/>
             </a:pPr>
+            <a:r>
+              <a:rPr lang="en"/>
+              <a:t>Checker: </a:t>
+            </a:r>
             <a:r>
               <a:rPr lang="en" u="sng">
                 <a:solidFill>
@@ -8916,6 +9014,167 @@
                 <a:hlinkClick r:id="rId3"/>
               </a:rPr>
               <a:t>https://forms.gle/mbH6aJxX5e3crr1B8</a:t>
+            </a:r>
+            <a:endParaRPr/>
+          </a:p>
+          <a:p>
+            <a:pPr indent="0" lvl="0" marL="0" rtl="0" algn="l">
+              <a:spcBef>
+                <a:spcPts val="1600"/>
+              </a:spcBef>
+              <a:spcAft>
+                <a:spcPts val="0"/>
+              </a:spcAft>
+              <a:buNone/>
+            </a:pPr>
+            <a:r>
+              <a:rPr lang="en"/>
+              <a:t>Input: </a:t>
+            </a:r>
+            <a:r>
+              <a:rPr lang="en" u="sng">
+                <a:solidFill>
+                  <a:schemeClr val="hlink"/>
+                </a:solidFill>
+                <a:hlinkClick r:id="rId4"/>
+              </a:rPr>
+              <a:t>https://github.com/OSUACM/Weekly_Events/blob/master/2019-09-06/LeapsAndBoundsInput</a:t>
+            </a:r>
+            <a:endParaRPr/>
+          </a:p>
+          <a:p>
+            <a:pPr indent="0" lvl="0" marL="0" rtl="0" algn="l">
+              <a:spcBef>
+                <a:spcPts val="1600"/>
+              </a:spcBef>
+              <a:spcAft>
+                <a:spcPts val="1600"/>
+              </a:spcAft>
+              <a:buNone/>
+            </a:pPr>
+            <a:r>
+              <a:t/>
+            </a:r>
+            <a:endParaRPr/>
+          </a:p>
+        </p:txBody>
+      </p:sp>
+    </p:spTree>
+  </p:cSld>
+  <p:clrMapOvr>
+    <a:masterClrMapping/>
+  </p:clrMapOvr>
+</p:sld>
+</file>
+
+<file path=ppt/slides/slide9.xml><?xml version="1.0" encoding="utf-8"?>
+<p:sld xmlns:a="http://schemas.openxmlformats.org/drawingml/2006/main" xmlns:r="http://schemas.openxmlformats.org/officeDocument/2006/relationships" xmlns:mc="http://schemas.openxmlformats.org/markup-compatibility/2006" xmlns:mv="urn:schemas-microsoft-com:mac:vml" xmlns:p="http://schemas.openxmlformats.org/presentationml/2006/main" xmlns:c="http://schemas.openxmlformats.org/drawingml/2006/chart" xmlns:dgm="http://schemas.openxmlformats.org/drawingml/2006/diagram" xmlns:o="urn:schemas-microsoft-com:office:office" xmlns:v="urn:schemas-microsoft-com:vml" xmlns:pvml="urn:schemas-microsoft-com:office:powerpoint" xmlns:com="http://schemas.openxmlformats.org/drawingml/2006/compatibility" xmlns:p14="http://schemas.microsoft.com/office/powerpoint/2010/main" xmlns:p15="http://schemas.microsoft.com/office/powerpoint/2012/main">
+  <p:cSld>
+    <p:spTree>
+      <p:nvGrpSpPr>
+        <p:cNvPr id="142" name="Shape 142"/>
+        <p:cNvGrpSpPr/>
+        <p:nvPr/>
+      </p:nvGrpSpPr>
+      <p:grpSpPr>
+        <a:xfrm>
+          <a:off x="0" y="0"/>
+          <a:ext cx="0" cy="0"/>
+          <a:chOff x="0" y="0"/>
+          <a:chExt cx="0" cy="0"/>
+        </a:xfrm>
+      </p:grpSpPr>
+      <p:sp>
+        <p:nvSpPr>
+          <p:cNvPr id="143" name="Google Shape;143;p21"/>
+          <p:cNvSpPr txBox="1"/>
+          <p:nvPr>
+            <p:ph type="title"/>
+          </p:nvPr>
+        </p:nvSpPr>
+        <p:spPr>
+          <a:xfrm>
+            <a:off x="311700" y="445025"/>
+            <a:ext cx="8520600" cy="572700"/>
+          </a:xfrm>
+          <a:prstGeom prst="rect">
+            <a:avLst/>
+          </a:prstGeom>
+        </p:spPr>
+        <p:txBody>
+          <a:bodyPr anchorCtr="0" anchor="t" bIns="91425" lIns="91425" spcFirstLastPara="1" rIns="91425" wrap="square" tIns="91425">
+            <a:noAutofit/>
+          </a:bodyPr>
+          <a:lstStyle/>
+          <a:p>
+            <a:pPr indent="0" lvl="0" marL="0" rtl="0" algn="l">
+              <a:spcBef>
+                <a:spcPts val="0"/>
+              </a:spcBef>
+              <a:spcAft>
+                <a:spcPts val="0"/>
+              </a:spcAft>
+              <a:buNone/>
+            </a:pPr>
+            <a:r>
+              <a:rPr lang="en"/>
+              <a:t>Next Week: CP lecture! (By Alex)</a:t>
+            </a:r>
+            <a:endParaRPr/>
+          </a:p>
+        </p:txBody>
+      </p:sp>
+      <p:sp>
+        <p:nvSpPr>
+          <p:cNvPr id="144" name="Google Shape;144;p21"/>
+          <p:cNvSpPr txBox="1"/>
+          <p:nvPr>
+            <p:ph idx="1" type="body"/>
+          </p:nvPr>
+        </p:nvSpPr>
+        <p:spPr>
+          <a:xfrm>
+            <a:off x="311700" y="1152475"/>
+            <a:ext cx="8520600" cy="3416400"/>
+          </a:xfrm>
+          <a:prstGeom prst="rect">
+            <a:avLst/>
+          </a:prstGeom>
+        </p:spPr>
+        <p:txBody>
+          <a:bodyPr anchorCtr="0" anchor="t" bIns="91425" lIns="91425" spcFirstLastPara="1" rIns="91425" wrap="square" tIns="91425">
+            <a:noAutofit/>
+          </a:bodyPr>
+          <a:lstStyle/>
+          <a:p>
+            <a:pPr indent="0" lvl="0" marL="0" rtl="0" algn="l">
+              <a:spcBef>
+                <a:spcPts val="0"/>
+              </a:spcBef>
+              <a:spcAft>
+                <a:spcPts val="0"/>
+              </a:spcAft>
+              <a:buNone/>
+            </a:pPr>
+            <a:r>
+              <a:rPr lang="en"/>
+              <a:t>Next meeting is on Tuesday (so soon!). It starts at 5:30 in Hitchcock 035.</a:t>
+            </a:r>
+            <a:endParaRPr/>
+          </a:p>
+          <a:p>
+            <a:pPr indent="0" lvl="0" marL="0" rtl="0" algn="l">
+              <a:spcBef>
+                <a:spcPts val="1600"/>
+              </a:spcBef>
+              <a:spcAft>
+                <a:spcPts val="1600"/>
+              </a:spcAft>
+              <a:buNone/>
+            </a:pPr>
+            <a:r>
+              <a:rPr lang="en"/>
+              <a:t>The lecture will be about game theory. It’s mostly intuition but you will learn basic DP on the way. </a:t>
             </a:r>
             <a:endParaRPr/>
           </a:p>

</xml_diff>